<commit_message>
Update slides for TP5
</commit_message>
<xml_diff>
--- a/OS202.pptx
+++ b/OS202.pptx
@@ -5,10 +5,10 @@
     <p:sldMasterId id="2147483648" r:id="rId1"/>
   </p:sldMasterIdLst>
   <p:notesMasterIdLst>
-    <p:notesMasterId r:id="rId21"/>
+    <p:notesMasterId r:id="rId26"/>
   </p:notesMasterIdLst>
   <p:handoutMasterIdLst>
-    <p:handoutMasterId r:id="rId22"/>
+    <p:handoutMasterId r:id="rId27"/>
   </p:handoutMasterIdLst>
   <p:sldIdLst>
     <p:sldId id="266" r:id="rId2"/>
@@ -30,6 +30,11 @@
     <p:sldId id="287" r:id="rId18"/>
     <p:sldId id="288" r:id="rId19"/>
     <p:sldId id="281" r:id="rId20"/>
+    <p:sldId id="290" r:id="rId21"/>
+    <p:sldId id="289" r:id="rId22"/>
+    <p:sldId id="293" r:id="rId23"/>
+    <p:sldId id="292" r:id="rId24"/>
+    <p:sldId id="291" r:id="rId25"/>
   </p:sldIdLst>
   <p:sldSz cx="9144000" cy="5143500" type="screen16x9"/>
   <p:notesSz cx="6858000" cy="9144000"/>
@@ -247,14 +252,14 @@
           <a:effectLst/>
           <a:extLst>
             <a:ext uri="{909E8E84-426E-40dd-AFC4-6F175D3DCCD1}">
-              <a14:hiddenFill xmlns="" xmlns:a14="http://schemas.microsoft.com/office/drawing/2010/main">
+              <a14:hiddenFill xmlns:a14="http://schemas.microsoft.com/office/drawing/2010/main" xmlns="">
                 <a:solidFill>
                   <a:schemeClr val="accent1"/>
                 </a:solidFill>
               </a14:hiddenFill>
             </a:ext>
             <a:ext uri="{91240B29-F687-4f45-9708-019B960494DF}">
-              <a14:hiddenLine xmlns="" xmlns:a14="http://schemas.microsoft.com/office/drawing/2010/main" w="9525">
+              <a14:hiddenLine xmlns:a14="http://schemas.microsoft.com/office/drawing/2010/main" xmlns="" w="9525">
                 <a:solidFill>
                   <a:schemeClr val="tx1"/>
                 </a:solidFill>
@@ -264,7 +269,7 @@
               </a14:hiddenLine>
             </a:ext>
             <a:ext uri="{AF507438-7753-43e0-B8FC-AC1667EBCBE1}">
-              <a14:hiddenEffects xmlns="" xmlns:a14="http://schemas.microsoft.com/office/drawing/2010/main">
+              <a14:hiddenEffects xmlns:a14="http://schemas.microsoft.com/office/drawing/2010/main" xmlns="">
                 <a:effectLst>
                   <a:outerShdw blurRad="63500" dist="38099" dir="2700000" algn="ctr" rotWithShape="0">
                     <a:srgbClr val="000000">
@@ -275,7 +280,7 @@
               </a14:hiddenEffects>
             </a:ext>
             <a:ext uri="{FAA26D3D-D897-4be2-8F04-BA451C77F1D7}">
-              <ma14:placeholderFlag xmlns="" xmlns:ma14="http://schemas.microsoft.com/office/mac/drawingml/2011/main" val="1"/>
+              <ma14:placeholderFlag xmlns:ma14="http://schemas.microsoft.com/office/mac/drawingml/2011/main" xmlns="" val="1"/>
             </a:ext>
           </a:extLst>
         </p:spPr>
@@ -323,14 +328,14 @@
           <a:effectLst/>
           <a:extLst>
             <a:ext uri="{909E8E84-426E-40dd-AFC4-6F175D3DCCD1}">
-              <a14:hiddenFill xmlns="" xmlns:a14="http://schemas.microsoft.com/office/drawing/2010/main">
+              <a14:hiddenFill xmlns:a14="http://schemas.microsoft.com/office/drawing/2010/main" xmlns="">
                 <a:solidFill>
                   <a:schemeClr val="accent1"/>
                 </a:solidFill>
               </a14:hiddenFill>
             </a:ext>
             <a:ext uri="{91240B29-F687-4f45-9708-019B960494DF}">
-              <a14:hiddenLine xmlns="" xmlns:a14="http://schemas.microsoft.com/office/drawing/2010/main" w="9525">
+              <a14:hiddenLine xmlns:a14="http://schemas.microsoft.com/office/drawing/2010/main" xmlns="" w="9525">
                 <a:solidFill>
                   <a:schemeClr val="tx1"/>
                 </a:solidFill>
@@ -340,7 +345,7 @@
               </a14:hiddenLine>
             </a:ext>
             <a:ext uri="{AF507438-7753-43e0-B8FC-AC1667EBCBE1}">
-              <a14:hiddenEffects xmlns="" xmlns:a14="http://schemas.microsoft.com/office/drawing/2010/main">
+              <a14:hiddenEffects xmlns:a14="http://schemas.microsoft.com/office/drawing/2010/main" xmlns="">
                 <a:effectLst>
                   <a:outerShdw blurRad="63500" dist="38099" dir="2700000" algn="ctr" rotWithShape="0">
                     <a:srgbClr val="000000">
@@ -351,7 +356,7 @@
               </a14:hiddenEffects>
             </a:ext>
             <a:ext uri="{FAA26D3D-D897-4be2-8F04-BA451C77F1D7}">
-              <ma14:placeholderFlag xmlns="" xmlns:ma14="http://schemas.microsoft.com/office/mac/drawingml/2011/main" val="1"/>
+              <ma14:placeholderFlag xmlns:ma14="http://schemas.microsoft.com/office/mac/drawingml/2011/main" xmlns="" val="1"/>
             </a:ext>
           </a:extLst>
         </p:spPr>
@@ -375,7 +380,7 @@
               <a:pPr>
                 <a:defRPr/>
               </a:pPr>
-              <a:t>12/02/2024</a:t>
+              <a:t>26/02/2024</a:t>
             </a:fld>
             <a:endParaRPr lang="fr-FR"/>
           </a:p>
@@ -406,14 +411,14 @@
           <a:effectLst/>
           <a:extLst>
             <a:ext uri="{909E8E84-426E-40dd-AFC4-6F175D3DCCD1}">
-              <a14:hiddenFill xmlns="" xmlns:a14="http://schemas.microsoft.com/office/drawing/2010/main">
+              <a14:hiddenFill xmlns:a14="http://schemas.microsoft.com/office/drawing/2010/main" xmlns="">
                 <a:solidFill>
                   <a:schemeClr val="accent1"/>
                 </a:solidFill>
               </a14:hiddenFill>
             </a:ext>
             <a:ext uri="{91240B29-F687-4f45-9708-019B960494DF}">
-              <a14:hiddenLine xmlns="" xmlns:a14="http://schemas.microsoft.com/office/drawing/2010/main" w="9525">
+              <a14:hiddenLine xmlns:a14="http://schemas.microsoft.com/office/drawing/2010/main" xmlns="" w="9525">
                 <a:solidFill>
                   <a:schemeClr val="tx1"/>
                 </a:solidFill>
@@ -423,7 +428,7 @@
               </a14:hiddenLine>
             </a:ext>
             <a:ext uri="{AF507438-7753-43e0-B8FC-AC1667EBCBE1}">
-              <a14:hiddenEffects xmlns="" xmlns:a14="http://schemas.microsoft.com/office/drawing/2010/main">
+              <a14:hiddenEffects xmlns:a14="http://schemas.microsoft.com/office/drawing/2010/main" xmlns="">
                 <a:effectLst>
                   <a:outerShdw blurRad="63500" dist="38099" dir="2700000" algn="ctr" rotWithShape="0">
                     <a:srgbClr val="000000">
@@ -434,7 +439,7 @@
               </a14:hiddenEffects>
             </a:ext>
             <a:ext uri="{FAA26D3D-D897-4be2-8F04-BA451C77F1D7}">
-              <ma14:placeholderFlag xmlns="" xmlns:ma14="http://schemas.microsoft.com/office/mac/drawingml/2011/main" val="1"/>
+              <ma14:placeholderFlag xmlns:ma14="http://schemas.microsoft.com/office/mac/drawingml/2011/main" xmlns="" val="1"/>
             </a:ext>
           </a:extLst>
         </p:spPr>
@@ -482,14 +487,14 @@
           <a:effectLst/>
           <a:extLst>
             <a:ext uri="{909E8E84-426E-40dd-AFC4-6F175D3DCCD1}">
-              <a14:hiddenFill xmlns="" xmlns:a14="http://schemas.microsoft.com/office/drawing/2010/main">
+              <a14:hiddenFill xmlns:a14="http://schemas.microsoft.com/office/drawing/2010/main" xmlns="">
                 <a:solidFill>
                   <a:schemeClr val="accent1"/>
                 </a:solidFill>
               </a14:hiddenFill>
             </a:ext>
             <a:ext uri="{91240B29-F687-4f45-9708-019B960494DF}">
-              <a14:hiddenLine xmlns="" xmlns:a14="http://schemas.microsoft.com/office/drawing/2010/main" w="9525">
+              <a14:hiddenLine xmlns:a14="http://schemas.microsoft.com/office/drawing/2010/main" xmlns="" w="9525">
                 <a:solidFill>
                   <a:schemeClr val="tx1"/>
                 </a:solidFill>
@@ -499,7 +504,7 @@
               </a14:hiddenLine>
             </a:ext>
             <a:ext uri="{AF507438-7753-43e0-B8FC-AC1667EBCBE1}">
-              <a14:hiddenEffects xmlns="" xmlns:a14="http://schemas.microsoft.com/office/drawing/2010/main">
+              <a14:hiddenEffects xmlns:a14="http://schemas.microsoft.com/office/drawing/2010/main" xmlns="">
                 <a:effectLst>
                   <a:outerShdw blurRad="63500" dist="38099" dir="2700000" algn="ctr" rotWithShape="0">
                     <a:srgbClr val="000000">
@@ -510,7 +515,7 @@
               </a14:hiddenEffects>
             </a:ext>
             <a:ext uri="{FAA26D3D-D897-4be2-8F04-BA451C77F1D7}">
-              <ma14:placeholderFlag xmlns="" xmlns:ma14="http://schemas.microsoft.com/office/mac/drawingml/2011/main" val="1"/>
+              <ma14:placeholderFlag xmlns:ma14="http://schemas.microsoft.com/office/mac/drawingml/2011/main" xmlns="" val="1"/>
             </a:ext>
           </a:extLst>
         </p:spPr>
@@ -601,14 +606,14 @@
           </a:ln>
           <a:extLst>
             <a:ext uri="{909E8E84-426E-40dd-AFC4-6F175D3DCCD1}">
-              <a14:hiddenFill xmlns="" xmlns:a14="http://schemas.microsoft.com/office/drawing/2010/main">
+              <a14:hiddenFill xmlns:a14="http://schemas.microsoft.com/office/drawing/2010/main" xmlns="">
                 <a:solidFill>
                   <a:schemeClr val="accent1"/>
                 </a:solidFill>
               </a14:hiddenFill>
             </a:ext>
             <a:ext uri="{91240B29-F687-4f45-9708-019B960494DF}">
-              <a14:hiddenLine xmlns="" xmlns:a14="http://schemas.microsoft.com/office/drawing/2010/main" w="9525">
+              <a14:hiddenLine xmlns:a14="http://schemas.microsoft.com/office/drawing/2010/main" xmlns="" w="9525">
                 <a:solidFill>
                   <a:schemeClr val="tx1"/>
                 </a:solidFill>
@@ -618,7 +623,7 @@
               </a14:hiddenLine>
             </a:ext>
             <a:ext uri="{FAA26D3D-D897-4be2-8F04-BA451C77F1D7}">
-              <ma14:placeholderFlag xmlns="" xmlns:ma14="http://schemas.microsoft.com/office/mac/drawingml/2011/main" val="1"/>
+              <ma14:placeholderFlag xmlns:ma14="http://schemas.microsoft.com/office/mac/drawingml/2011/main" xmlns="" val="1"/>
             </a:ext>
           </a:extLst>
         </p:spPr>
@@ -670,14 +675,14 @@
           </a:ln>
           <a:extLst>
             <a:ext uri="{909E8E84-426E-40dd-AFC4-6F175D3DCCD1}">
-              <a14:hiddenFill xmlns="" xmlns:a14="http://schemas.microsoft.com/office/drawing/2010/main">
+              <a14:hiddenFill xmlns:a14="http://schemas.microsoft.com/office/drawing/2010/main" xmlns="">
                 <a:solidFill>
                   <a:schemeClr val="accent1"/>
                 </a:solidFill>
               </a14:hiddenFill>
             </a:ext>
             <a:ext uri="{91240B29-F687-4f45-9708-019B960494DF}">
-              <a14:hiddenLine xmlns="" xmlns:a14="http://schemas.microsoft.com/office/drawing/2010/main" w="9525">
+              <a14:hiddenLine xmlns:a14="http://schemas.microsoft.com/office/drawing/2010/main" xmlns="" w="9525">
                 <a:solidFill>
                   <a:schemeClr val="tx1"/>
                 </a:solidFill>
@@ -687,7 +692,7 @@
               </a14:hiddenLine>
             </a:ext>
             <a:ext uri="{FAA26D3D-D897-4be2-8F04-BA451C77F1D7}">
-              <ma14:placeholderFlag xmlns="" xmlns:ma14="http://schemas.microsoft.com/office/mac/drawingml/2011/main" val="1"/>
+              <ma14:placeholderFlag xmlns:ma14="http://schemas.microsoft.com/office/mac/drawingml/2011/main" xmlns="" val="1"/>
             </a:ext>
           </a:extLst>
         </p:spPr>
@@ -745,7 +750,7 @@
           <a:effectLst/>
           <a:extLst>
             <a:ext uri="{AF507438-7753-43e0-B8FC-AC1667EBCBE1}">
-              <a14:hiddenEffects xmlns="" xmlns:a14="http://schemas.microsoft.com/office/drawing/2010/main">
+              <a14:hiddenEffects xmlns:a14="http://schemas.microsoft.com/office/drawing/2010/main" xmlns="">
                 <a:effectLst>
                   <a:outerShdw blurRad="63500" dist="38099" dir="2700000" algn="ctr" rotWithShape="0">
                     <a:srgbClr val="000000">
@@ -756,7 +761,7 @@
               </a14:hiddenEffects>
             </a:ext>
             <a:ext uri="{53640926-AAD7-44d8-BBD7-CCE9431645EC}">
-              <a14:shadowObscured xmlns="" xmlns:a14="http://schemas.microsoft.com/office/drawing/2010/main" val="1"/>
+              <a14:shadowObscured xmlns:a14="http://schemas.microsoft.com/office/drawing/2010/main" xmlns="" val="1"/>
             </a:ext>
           </a:extLst>
         </p:spPr>
@@ -785,14 +790,14 @@
           </a:ln>
           <a:extLst>
             <a:ext uri="{909E8E84-426E-40dd-AFC4-6F175D3DCCD1}">
-              <a14:hiddenFill xmlns="" xmlns:a14="http://schemas.microsoft.com/office/drawing/2010/main">
+              <a14:hiddenFill xmlns:a14="http://schemas.microsoft.com/office/drawing/2010/main" xmlns="">
                 <a:solidFill>
                   <a:schemeClr val="accent1"/>
                 </a:solidFill>
               </a14:hiddenFill>
             </a:ext>
             <a:ext uri="{91240B29-F687-4f45-9708-019B960494DF}">
-              <a14:hiddenLine xmlns="" xmlns:a14="http://schemas.microsoft.com/office/drawing/2010/main" w="9525">
+              <a14:hiddenLine xmlns:a14="http://schemas.microsoft.com/office/drawing/2010/main" xmlns="" w="9525">
                 <a:solidFill>
                   <a:schemeClr val="tx1"/>
                 </a:solidFill>
@@ -802,7 +807,7 @@
               </a14:hiddenLine>
             </a:ext>
             <a:ext uri="{FAA26D3D-D897-4be2-8F04-BA451C77F1D7}">
-              <ma14:placeholderFlag xmlns="" xmlns:ma14="http://schemas.microsoft.com/office/mac/drawingml/2011/main" val="1"/>
+              <ma14:placeholderFlag xmlns:ma14="http://schemas.microsoft.com/office/mac/drawingml/2011/main" xmlns="" val="1"/>
             </a:ext>
           </a:extLst>
         </p:spPr>
@@ -874,14 +879,14 @@
           </a:ln>
           <a:extLst>
             <a:ext uri="{909E8E84-426E-40dd-AFC4-6F175D3DCCD1}">
-              <a14:hiddenFill xmlns="" xmlns:a14="http://schemas.microsoft.com/office/drawing/2010/main">
+              <a14:hiddenFill xmlns:a14="http://schemas.microsoft.com/office/drawing/2010/main" xmlns="">
                 <a:solidFill>
                   <a:schemeClr val="accent1"/>
                 </a:solidFill>
               </a14:hiddenFill>
             </a:ext>
             <a:ext uri="{91240B29-F687-4f45-9708-019B960494DF}">
-              <a14:hiddenLine xmlns="" xmlns:a14="http://schemas.microsoft.com/office/drawing/2010/main" w="9525">
+              <a14:hiddenLine xmlns:a14="http://schemas.microsoft.com/office/drawing/2010/main" xmlns="" w="9525">
                 <a:solidFill>
                   <a:schemeClr val="tx1"/>
                 </a:solidFill>
@@ -891,7 +896,7 @@
               </a14:hiddenLine>
             </a:ext>
             <a:ext uri="{FAA26D3D-D897-4be2-8F04-BA451C77F1D7}">
-              <ma14:placeholderFlag xmlns="" xmlns:ma14="http://schemas.microsoft.com/office/mac/drawingml/2011/main" val="1"/>
+              <ma14:placeholderFlag xmlns:ma14="http://schemas.microsoft.com/office/mac/drawingml/2011/main" xmlns="" val="1"/>
             </a:ext>
           </a:extLst>
         </p:spPr>
@@ -943,14 +948,14 @@
           </a:ln>
           <a:extLst>
             <a:ext uri="{909E8E84-426E-40dd-AFC4-6F175D3DCCD1}">
-              <a14:hiddenFill xmlns="" xmlns:a14="http://schemas.microsoft.com/office/drawing/2010/main">
+              <a14:hiddenFill xmlns:a14="http://schemas.microsoft.com/office/drawing/2010/main" xmlns="">
                 <a:solidFill>
                   <a:schemeClr val="accent1"/>
                 </a:solidFill>
               </a14:hiddenFill>
             </a:ext>
             <a:ext uri="{91240B29-F687-4f45-9708-019B960494DF}">
-              <a14:hiddenLine xmlns="" xmlns:a14="http://schemas.microsoft.com/office/drawing/2010/main" w="9525">
+              <a14:hiddenLine xmlns:a14="http://schemas.microsoft.com/office/drawing/2010/main" xmlns="" w="9525">
                 <a:solidFill>
                   <a:schemeClr val="tx1"/>
                 </a:solidFill>
@@ -960,7 +965,7 @@
               </a14:hiddenLine>
             </a:ext>
             <a:ext uri="{FAA26D3D-D897-4be2-8F04-BA451C77F1D7}">
-              <ma14:placeholderFlag xmlns="" xmlns:ma14="http://schemas.microsoft.com/office/mac/drawingml/2011/main" val="1"/>
+              <ma14:placeholderFlag xmlns:ma14="http://schemas.microsoft.com/office/mac/drawingml/2011/main" xmlns="" val="1"/>
             </a:ext>
           </a:extLst>
         </p:spPr>
@@ -1287,14 +1292,14 @@
           </a:ln>
           <a:extLst>
             <a:ext uri="{909E8E84-426E-40dd-AFC4-6F175D3DCCD1}">
-              <a14:hiddenFill xmlns="" xmlns:a14="http://schemas.microsoft.com/office/drawing/2010/main">
+              <a14:hiddenFill xmlns:a14="http://schemas.microsoft.com/office/drawing/2010/main" xmlns="">
                 <a:solidFill>
                   <a:srgbClr val="FFFFFF"/>
                 </a:solidFill>
               </a14:hiddenFill>
             </a:ext>
             <a:ext uri="{91240B29-F687-4f45-9708-019B960494DF}">
-              <a14:hiddenLine xmlns="" xmlns:a14="http://schemas.microsoft.com/office/drawing/2010/main" w="9525">
+              <a14:hiddenLine xmlns:a14="http://schemas.microsoft.com/office/drawing/2010/main" xmlns="" w="9525">
                 <a:solidFill>
                   <a:srgbClr val="000000"/>
                 </a:solidFill>
@@ -1341,14 +1346,14 @@
           </a:ln>
           <a:extLst>
             <a:ext uri="{909E8E84-426E-40dd-AFC4-6F175D3DCCD1}">
-              <a14:hiddenFill xmlns="" xmlns:a14="http://schemas.microsoft.com/office/drawing/2010/main">
+              <a14:hiddenFill xmlns:a14="http://schemas.microsoft.com/office/drawing/2010/main" xmlns="">
                 <a:solidFill>
                   <a:srgbClr val="FFFFFF"/>
                 </a:solidFill>
               </a14:hiddenFill>
             </a:ext>
             <a:ext uri="{91240B29-F687-4f45-9708-019B960494DF}">
-              <a14:hiddenLine xmlns="" xmlns:a14="http://schemas.microsoft.com/office/drawing/2010/main" w="9525">
+              <a14:hiddenLine xmlns:a14="http://schemas.microsoft.com/office/drawing/2010/main" xmlns="" w="9525">
                 <a:solidFill>
                   <a:srgbClr val="000000"/>
                 </a:solidFill>
@@ -1709,14 +1714,14 @@
           <a:effectLst/>
           <a:extLst>
             <a:ext uri="{909E8E84-426E-40dd-AFC4-6F175D3DCCD1}">
-              <a14:hiddenFill xmlns="" xmlns:a14="http://schemas.microsoft.com/office/drawing/2010/main">
+              <a14:hiddenFill xmlns:a14="http://schemas.microsoft.com/office/drawing/2010/main" xmlns="">
                 <a:solidFill>
                   <a:schemeClr val="accent1"/>
                 </a:solidFill>
               </a14:hiddenFill>
             </a:ext>
             <a:ext uri="{AF507438-7753-43e0-B8FC-AC1667EBCBE1}">
-              <a14:hiddenEffects xmlns="" xmlns:a14="http://schemas.microsoft.com/office/drawing/2010/main">
+              <a14:hiddenEffects xmlns:a14="http://schemas.microsoft.com/office/drawing/2010/main" xmlns="">
                 <a:effectLst>
                   <a:outerShdw blurRad="63500" dist="38099" dir="2700000" algn="ctr" rotWithShape="0">
                     <a:srgbClr val="000000">
@@ -2679,14 +2684,14 @@
           </a:ln>
           <a:extLst>
             <a:ext uri="{909E8E84-426E-40dd-AFC4-6F175D3DCCD1}">
-              <a14:hiddenFill xmlns="" xmlns:a14="http://schemas.microsoft.com/office/drawing/2010/main">
+              <a14:hiddenFill xmlns:a14="http://schemas.microsoft.com/office/drawing/2010/main" xmlns="">
                 <a:solidFill>
                   <a:schemeClr val="accent1"/>
                 </a:solidFill>
               </a14:hiddenFill>
             </a:ext>
             <a:ext uri="{91240B29-F687-4f45-9708-019B960494DF}">
-              <a14:hiddenLine xmlns="" xmlns:a14="http://schemas.microsoft.com/office/drawing/2010/main" w="9525">
+              <a14:hiddenLine xmlns:a14="http://schemas.microsoft.com/office/drawing/2010/main" xmlns="" w="9525">
                 <a:solidFill>
                   <a:schemeClr val="tx1"/>
                 </a:solidFill>
@@ -2696,7 +2701,7 @@
               </a14:hiddenLine>
             </a:ext>
             <a:ext uri="{FAA26D3D-D897-4be2-8F04-BA451C77F1D7}">
-              <ma14:placeholderFlag xmlns="" xmlns:ma14="http://schemas.microsoft.com/office/mac/drawingml/2011/main" val="1"/>
+              <ma14:placeholderFlag xmlns:ma14="http://schemas.microsoft.com/office/mac/drawingml/2011/main" xmlns="" val="1"/>
             </a:ext>
           </a:extLst>
         </p:spPr>
@@ -2740,14 +2745,14 @@
           </a:ln>
           <a:extLst>
             <a:ext uri="{909E8E84-426E-40dd-AFC4-6F175D3DCCD1}">
-              <a14:hiddenFill xmlns="" xmlns:a14="http://schemas.microsoft.com/office/drawing/2010/main">
+              <a14:hiddenFill xmlns:a14="http://schemas.microsoft.com/office/drawing/2010/main" xmlns="">
                 <a:solidFill>
                   <a:schemeClr val="accent1"/>
                 </a:solidFill>
               </a14:hiddenFill>
             </a:ext>
             <a:ext uri="{91240B29-F687-4f45-9708-019B960494DF}">
-              <a14:hiddenLine xmlns="" xmlns:a14="http://schemas.microsoft.com/office/drawing/2010/main" w="9525">
+              <a14:hiddenLine xmlns:a14="http://schemas.microsoft.com/office/drawing/2010/main" xmlns="" w="9525">
                 <a:solidFill>
                   <a:schemeClr val="tx1"/>
                 </a:solidFill>
@@ -2757,7 +2762,7 @@
               </a14:hiddenLine>
             </a:ext>
             <a:ext uri="{FAA26D3D-D897-4be2-8F04-BA451C77F1D7}">
-              <ma14:placeholderFlag xmlns="" xmlns:ma14="http://schemas.microsoft.com/office/mac/drawingml/2011/main" val="1"/>
+              <ma14:placeholderFlag xmlns:ma14="http://schemas.microsoft.com/office/mac/drawingml/2011/main" xmlns="" val="1"/>
             </a:ext>
           </a:extLst>
         </p:spPr>
@@ -2829,14 +2834,14 @@
           </a:ln>
           <a:extLst>
             <a:ext uri="{909E8E84-426E-40dd-AFC4-6F175D3DCCD1}">
-              <a14:hiddenFill xmlns="" xmlns:a14="http://schemas.microsoft.com/office/drawing/2010/main">
+              <a14:hiddenFill xmlns:a14="http://schemas.microsoft.com/office/drawing/2010/main" xmlns="">
                 <a:solidFill>
                   <a:schemeClr val="accent1"/>
                 </a:solidFill>
               </a14:hiddenFill>
             </a:ext>
             <a:ext uri="{91240B29-F687-4f45-9708-019B960494DF}">
-              <a14:hiddenLine xmlns="" xmlns:a14="http://schemas.microsoft.com/office/drawing/2010/main" w="9525">
+              <a14:hiddenLine xmlns:a14="http://schemas.microsoft.com/office/drawing/2010/main" xmlns="" w="9525">
                 <a:solidFill>
                   <a:schemeClr val="tx1"/>
                 </a:solidFill>
@@ -2846,7 +2851,7 @@
               </a14:hiddenLine>
             </a:ext>
             <a:ext uri="{FAA26D3D-D897-4be2-8F04-BA451C77F1D7}">
-              <ma14:placeholderFlag xmlns="" xmlns:ma14="http://schemas.microsoft.com/office/mac/drawingml/2011/main" val="1"/>
+              <ma14:placeholderFlag xmlns:ma14="http://schemas.microsoft.com/office/mac/drawingml/2011/main" xmlns="" val="1"/>
             </a:ext>
           </a:extLst>
         </p:spPr>
@@ -2956,14 +2961,14 @@
           </a:ln>
           <a:extLst>
             <a:ext uri="{909E8E84-426E-40dd-AFC4-6F175D3DCCD1}">
-              <a14:hiddenFill xmlns="" xmlns:a14="http://schemas.microsoft.com/office/drawing/2010/main">
+              <a14:hiddenFill xmlns:a14="http://schemas.microsoft.com/office/drawing/2010/main" xmlns="">
                 <a:solidFill>
                   <a:srgbClr val="FFFFFF"/>
                 </a:solidFill>
               </a14:hiddenFill>
             </a:ext>
             <a:ext uri="{91240B29-F687-4f45-9708-019B960494DF}">
-              <a14:hiddenLine xmlns="" xmlns:a14="http://schemas.microsoft.com/office/drawing/2010/main" w="9525">
+              <a14:hiddenLine xmlns:a14="http://schemas.microsoft.com/office/drawing/2010/main" xmlns="" w="9525">
                 <a:solidFill>
                   <a:srgbClr val="000000"/>
                 </a:solidFill>
@@ -3010,14 +3015,14 @@
           </a:ln>
           <a:extLst>
             <a:ext uri="{909E8E84-426E-40dd-AFC4-6F175D3DCCD1}">
-              <a14:hiddenFill xmlns="" xmlns:a14="http://schemas.microsoft.com/office/drawing/2010/main">
+              <a14:hiddenFill xmlns:a14="http://schemas.microsoft.com/office/drawing/2010/main" xmlns="">
                 <a:solidFill>
                   <a:srgbClr val="FFFFFF"/>
                 </a:solidFill>
               </a14:hiddenFill>
             </a:ext>
             <a:ext uri="{91240B29-F687-4f45-9708-019B960494DF}">
-              <a14:hiddenLine xmlns="" xmlns:a14="http://schemas.microsoft.com/office/drawing/2010/main" w="9525">
+              <a14:hiddenLine xmlns:a14="http://schemas.microsoft.com/office/drawing/2010/main" xmlns="" w="9525">
                 <a:solidFill>
                   <a:srgbClr val="000000"/>
                 </a:solidFill>
@@ -3056,14 +3061,14 @@
           <a:effectLst/>
           <a:extLst>
             <a:ext uri="{909E8E84-426E-40dd-AFC4-6F175D3DCCD1}">
-              <a14:hiddenFill xmlns="" xmlns:a14="http://schemas.microsoft.com/office/drawing/2010/main">
+              <a14:hiddenFill xmlns:a14="http://schemas.microsoft.com/office/drawing/2010/main" xmlns="">
                 <a:solidFill>
                   <a:schemeClr val="accent1"/>
                 </a:solidFill>
               </a14:hiddenFill>
             </a:ext>
             <a:ext uri="{AF507438-7753-43e0-B8FC-AC1667EBCBE1}">
-              <a14:hiddenEffects xmlns="" xmlns:a14="http://schemas.microsoft.com/office/drawing/2010/main">
+              <a14:hiddenEffects xmlns:a14="http://schemas.microsoft.com/office/drawing/2010/main" xmlns="">
                 <a:effectLst>
                   <a:outerShdw blurRad="63500" dist="38099" dir="2700000" algn="ctr" rotWithShape="0">
                     <a:srgbClr val="000000">
@@ -4363,16 +4368,17 @@
             <a:pPr lvl="1"/>
             <a:r>
               <a:rPr lang="fr-FR" dirty="0"/>
-              <a:t>À rendre pour le ../../.. (lien </a:t>
+              <a:t>À rendre pour le vendredi 08/03/2024 (</a:t>
             </a:r>
             <a:r>
               <a:rPr lang="fr-FR" dirty="0" err="1"/>
-              <a:t>github</a:t>
-            </a:r>
-            <a:r>
-              <a:rPr lang="fr-FR" dirty="0"/>
-              <a:t>)</a:t>
-            </a:r>
+              <a:t>JuvignyEnsta</a:t>
+            </a:r>
+            <a:r>
+              <a:rPr lang="fr-FR"/>
+              <a:t>/Fourmis2024)</a:t>
+            </a:r>
+            <a:endParaRPr lang="fr-FR" dirty="0"/>
           </a:p>
           <a:p>
             <a:pPr lvl="1"/>
@@ -4411,24 +4417,45 @@
               <a:t> </a:t>
             </a:r>
             <a:r>
-              <a:rPr lang="fr-FR"/>
-              <a:t>mandelbrot)</a:t>
+              <a:rPr lang="fr-FR" dirty="0" err="1"/>
+              <a:t>mandelbrot</a:t>
+            </a:r>
+            <a:r>
+              <a:rPr lang="fr-FR" dirty="0"/>
+              <a:t>)</a:t>
+            </a:r>
+          </a:p>
+          <a:p>
+            <a:pPr lvl="2"/>
+            <a:r>
+              <a:rPr lang="fr-FR" dirty="0"/>
+              <a:t>Statique</a:t>
+            </a:r>
+          </a:p>
+          <a:p>
+            <a:pPr lvl="2"/>
+            <a:r>
+              <a:rPr lang="fr-FR" dirty="0"/>
+              <a:t>Dynamique</a:t>
+            </a:r>
+          </a:p>
+          <a:p>
+            <a:pPr lvl="1"/>
+            <a:r>
+              <a:rPr lang="fr-FR" dirty="0"/>
+              <a:t>Cf. </a:t>
+            </a:r>
+            <a:r>
+              <a:rPr lang="fr-FR" dirty="0">
+                <a:hlinkClick r:id="rId2"/>
+              </a:rPr>
+              <a:t>https://github.com/JDGaraudEnsta/OS202-2024.git</a:t>
             </a:r>
             <a:endParaRPr lang="fr-FR" dirty="0"/>
           </a:p>
           <a:p>
-            <a:pPr lvl="2"/>
-            <a:r>
-              <a:rPr lang="fr-FR" dirty="0"/>
-              <a:t>Statique</a:t>
-            </a:r>
-          </a:p>
-          <a:p>
-            <a:pPr lvl="2"/>
-            <a:r>
-              <a:rPr lang="fr-FR" dirty="0"/>
-              <a:t>Dynamique</a:t>
-            </a:r>
+            <a:pPr lvl="1"/>
+            <a:endParaRPr lang="fr-FR" dirty="0"/>
           </a:p>
           <a:p>
             <a:endParaRPr lang="fr-FR" dirty="0"/>
@@ -5404,14 +5431,14 @@
           </a:ln>
           <a:extLst>
             <a:ext uri="{909E8E84-426E-40dd-AFC4-6F175D3DCCD1}">
-              <a14:hiddenFill xmlns="" xmlns:a14="http://schemas.microsoft.com/office/drawing/2010/main">
+              <a14:hiddenFill xmlns:a14="http://schemas.microsoft.com/office/drawing/2010/main" xmlns="">
                 <a:solidFill>
                   <a:schemeClr val="accent1"/>
                 </a:solidFill>
               </a14:hiddenFill>
             </a:ext>
             <a:ext uri="{91240B29-F687-4f45-9708-019B960494DF}">
-              <a14:hiddenLine xmlns="" xmlns:a14="http://schemas.microsoft.com/office/drawing/2010/main" w="9525">
+              <a14:hiddenLine xmlns:a14="http://schemas.microsoft.com/office/drawing/2010/main" xmlns="" w="9525">
                 <a:solidFill>
                   <a:schemeClr val="tx1"/>
                 </a:solidFill>
@@ -5421,7 +5448,7 @@
               </a14:hiddenLine>
             </a:ext>
             <a:ext uri="{FAA26D3D-D897-4be2-8F04-BA451C77F1D7}">
-              <ma14:placeholderFlag xmlns="" xmlns:ma14="http://schemas.microsoft.com/office/mac/drawingml/2011/main" val="1"/>
+              <ma14:placeholderFlag xmlns:ma14="http://schemas.microsoft.com/office/mac/drawingml/2011/main" xmlns="" val="1"/>
             </a:ext>
           </a:extLst>
         </p:spPr>
@@ -5463,7 +5490,7 @@
           <a:effectLst/>
           <a:extLst>
             <a:ext uri="{AF507438-7753-43e0-B8FC-AC1667EBCBE1}">
-              <a14:hiddenEffects xmlns="" xmlns:a14="http://schemas.microsoft.com/office/drawing/2010/main">
+              <a14:hiddenEffects xmlns:a14="http://schemas.microsoft.com/office/drawing/2010/main" xmlns="">
                 <a:effectLst>
                   <a:outerShdw blurRad="63500" dist="38099" dir="2700000" algn="ctr" rotWithShape="0">
                     <a:schemeClr val="bg2">
@@ -5513,7 +5540,7 @@
           <a:effectLst/>
           <a:extLst>
             <a:ext uri="{AF507438-7753-43e0-B8FC-AC1667EBCBE1}">
-              <a14:hiddenEffects xmlns="" xmlns:a14="http://schemas.microsoft.com/office/drawing/2010/main">
+              <a14:hiddenEffects xmlns:a14="http://schemas.microsoft.com/office/drawing/2010/main" xmlns="">
                 <a:effectLst>
                   <a:outerShdw blurRad="63500" dist="38099" dir="2700000" algn="ctr" rotWithShape="0">
                     <a:schemeClr val="bg2">
@@ -5712,7 +5739,7 @@
           <a:effectLst/>
           <a:extLst>
             <a:ext uri="{AF507438-7753-43e0-B8FC-AC1667EBCBE1}">
-              <a14:hiddenEffects xmlns="" xmlns:a14="http://schemas.microsoft.com/office/drawing/2010/main">
+              <a14:hiddenEffects xmlns:a14="http://schemas.microsoft.com/office/drawing/2010/main" xmlns="">
                 <a:effectLst>
                   <a:outerShdw blurRad="63500" dist="38099" dir="2700000" algn="ctr" rotWithShape="0">
                     <a:schemeClr val="bg2">
@@ -5789,14 +5816,14 @@
           </a:ln>
           <a:extLst>
             <a:ext uri="{909E8E84-426E-40dd-AFC4-6F175D3DCCD1}">
-              <a14:hiddenFill xmlns="" xmlns:a14="http://schemas.microsoft.com/office/drawing/2010/main">
+              <a14:hiddenFill xmlns:a14="http://schemas.microsoft.com/office/drawing/2010/main" xmlns="">
                 <a:solidFill>
                   <a:schemeClr val="accent1"/>
                 </a:solidFill>
               </a14:hiddenFill>
             </a:ext>
             <a:ext uri="{91240B29-F687-4f45-9708-019B960494DF}">
-              <a14:hiddenLine xmlns="" xmlns:a14="http://schemas.microsoft.com/office/drawing/2010/main" w="9525">
+              <a14:hiddenLine xmlns:a14="http://schemas.microsoft.com/office/drawing/2010/main" xmlns="" w="9525">
                 <a:solidFill>
                   <a:schemeClr val="tx1"/>
                 </a:solidFill>
@@ -5806,7 +5833,7 @@
               </a14:hiddenLine>
             </a:ext>
             <a:ext uri="{FAA26D3D-D897-4be2-8F04-BA451C77F1D7}">
-              <ma14:placeholderFlag xmlns="" xmlns:ma14="http://schemas.microsoft.com/office/mac/drawingml/2011/main" val="1"/>
+              <ma14:placeholderFlag xmlns:ma14="http://schemas.microsoft.com/office/mac/drawingml/2011/main" xmlns="" val="1"/>
             </a:ext>
           </a:extLst>
         </p:spPr>
@@ -5940,7 +5967,7 @@
           <a:effectLst/>
           <a:extLst>
             <a:ext uri="{AF507438-7753-43e0-B8FC-AC1667EBCBE1}">
-              <a14:hiddenEffects xmlns="" xmlns:a14="http://schemas.microsoft.com/office/drawing/2010/main">
+              <a14:hiddenEffects xmlns:a14="http://schemas.microsoft.com/office/drawing/2010/main" xmlns="">
                 <a:effectLst>
                   <a:outerShdw blurRad="63500" dist="38099" dir="2700000" algn="ctr" rotWithShape="0">
                     <a:schemeClr val="bg2">
@@ -6151,13 +6178,8 @@
             <a:pPr lvl="1"/>
             <a:r>
               <a:rPr lang="fr-FR" dirty="0"/>
-              <a:t>Discuter </a:t>
-            </a:r>
-            <a:r>
-              <a:rPr lang="fr-FR"/>
-              <a:t>le résultat</a:t>
-            </a:r>
-            <a:endParaRPr lang="fr-FR" dirty="0"/>
+              <a:t>Interpréter et discuter vos résultats</a:t>
+            </a:r>
           </a:p>
           <a:p>
             <a:pPr lvl="1"/>
@@ -6473,6 +6495,1347 @@
     <p:extLst>
       <p:ext uri="{BB962C8B-B14F-4D97-AF65-F5344CB8AC3E}">
         <p14:creationId xmlns:p14="http://schemas.microsoft.com/office/powerpoint/2010/main" val="2256365781"/>
+      </p:ext>
+    </p:extLst>
+  </p:cSld>
+  <p:clrMapOvr>
+    <a:masterClrMapping/>
+  </p:clrMapOvr>
+</p:sld>
+</file>
+
+<file path=ppt/slides/slide20.xml><?xml version="1.0" encoding="utf-8"?>
+<p:sld xmlns:a="http://schemas.openxmlformats.org/drawingml/2006/main" xmlns:r="http://schemas.openxmlformats.org/officeDocument/2006/relationships" xmlns:p="http://schemas.openxmlformats.org/presentationml/2006/main">
+  <p:cSld>
+    <p:spTree>
+      <p:nvGrpSpPr>
+        <p:cNvPr id="1" name=""/>
+        <p:cNvGrpSpPr/>
+        <p:nvPr/>
+      </p:nvGrpSpPr>
+      <p:grpSpPr>
+        <a:xfrm>
+          <a:off x="0" y="0"/>
+          <a:ext cx="0" cy="0"/>
+          <a:chOff x="0" y="0"/>
+          <a:chExt cx="0" cy="0"/>
+        </a:xfrm>
+      </p:grpSpPr>
+      <p:sp>
+        <p:nvSpPr>
+          <p:cNvPr id="8" name="Titre 7">
+            <a:extLst>
+              <a:ext uri="{FF2B5EF4-FFF2-40B4-BE49-F238E27FC236}">
+                <a16:creationId xmlns:a16="http://schemas.microsoft.com/office/drawing/2014/main" id="{A942CB6C-D8FF-449F-909A-C6D510FF1ADF}"/>
+              </a:ext>
+            </a:extLst>
+          </p:cNvPr>
+          <p:cNvSpPr>
+            <a:spLocks noGrp="1"/>
+          </p:cNvSpPr>
+          <p:nvPr>
+            <p:ph type="ctrTitle"/>
+          </p:nvPr>
+        </p:nvSpPr>
+        <p:spPr/>
+        <p:txBody>
+          <a:bodyPr/>
+          <a:lstStyle/>
+          <a:p>
+            <a:r>
+              <a:rPr lang="fr-FR" dirty="0"/>
+              <a:t>5</a:t>
+            </a:r>
+            <a:r>
+              <a:rPr lang="fr-FR" baseline="30000" dirty="0"/>
+              <a:t>e</a:t>
+            </a:r>
+            <a:r>
+              <a:rPr lang="fr-FR" dirty="0"/>
+              <a:t> séance (27/02/2024)</a:t>
+            </a:r>
+          </a:p>
+        </p:txBody>
+      </p:sp>
+      <p:sp>
+        <p:nvSpPr>
+          <p:cNvPr id="9" name="Sous-titre 8">
+            <a:extLst>
+              <a:ext uri="{FF2B5EF4-FFF2-40B4-BE49-F238E27FC236}">
+                <a16:creationId xmlns:a16="http://schemas.microsoft.com/office/drawing/2014/main" id="{8B718A3A-52EB-4460-8C20-74A6C48A14CC}"/>
+              </a:ext>
+            </a:extLst>
+          </p:cNvPr>
+          <p:cNvSpPr>
+            <a:spLocks noGrp="1"/>
+          </p:cNvSpPr>
+          <p:nvPr>
+            <p:ph type="subTitle" idx="1"/>
+          </p:nvPr>
+        </p:nvSpPr>
+        <p:spPr/>
+        <p:txBody>
+          <a:bodyPr/>
+          <a:lstStyle/>
+          <a:p>
+            <a:endParaRPr lang="fr-FR"/>
+          </a:p>
+        </p:txBody>
+      </p:sp>
+      <p:sp>
+        <p:nvSpPr>
+          <p:cNvPr id="4" name="Espace réservé du numéro de diapositive 3">
+            <a:extLst>
+              <a:ext uri="{FF2B5EF4-FFF2-40B4-BE49-F238E27FC236}">
+                <a16:creationId xmlns:a16="http://schemas.microsoft.com/office/drawing/2014/main" id="{BB5B828F-A84A-485B-86E7-037385684FC5}"/>
+              </a:ext>
+            </a:extLst>
+          </p:cNvPr>
+          <p:cNvSpPr>
+            <a:spLocks noGrp="1"/>
+          </p:cNvSpPr>
+          <p:nvPr>
+            <p:ph type="sldNum" sz="quarter" idx="10"/>
+          </p:nvPr>
+        </p:nvSpPr>
+        <p:spPr/>
+        <p:txBody>
+          <a:bodyPr/>
+          <a:lstStyle/>
+          <a:p>
+            <a:pPr>
+              <a:defRPr/>
+            </a:pPr>
+            <a:fld id="{1EEDFC2C-F9B9-0445-A511-DA4552EF3EEB}" type="slidenum">
+              <a:rPr lang="fr-FR" smtClean="0"/>
+              <a:pPr>
+                <a:defRPr/>
+              </a:pPr>
+              <a:t>20</a:t>
+            </a:fld>
+            <a:endParaRPr lang="fr-FR"/>
+          </a:p>
+        </p:txBody>
+      </p:sp>
+      <p:sp>
+        <p:nvSpPr>
+          <p:cNvPr id="5" name="Espace réservé du pied de page 4">
+            <a:extLst>
+              <a:ext uri="{FF2B5EF4-FFF2-40B4-BE49-F238E27FC236}">
+                <a16:creationId xmlns:a16="http://schemas.microsoft.com/office/drawing/2014/main" id="{BCAFCBF7-00C9-4851-A5CD-BC2D48D44F62}"/>
+              </a:ext>
+            </a:extLst>
+          </p:cNvPr>
+          <p:cNvSpPr>
+            <a:spLocks noGrp="1"/>
+          </p:cNvSpPr>
+          <p:nvPr>
+            <p:ph type="ftr" sz="quarter" idx="4294967295"/>
+          </p:nvPr>
+        </p:nvSpPr>
+        <p:spPr>
+          <a:xfrm>
+            <a:off x="3527425" y="4732338"/>
+            <a:ext cx="5616575" cy="287337"/>
+          </a:xfrm>
+        </p:spPr>
+        <p:txBody>
+          <a:bodyPr/>
+          <a:lstStyle/>
+          <a:p>
+            <a:r>
+              <a:rPr lang="fr-FR"/>
+              <a:t>Titre de la présentation</a:t>
+            </a:r>
+            <a:endParaRPr lang="fr-FR" dirty="0"/>
+          </a:p>
+        </p:txBody>
+      </p:sp>
+    </p:spTree>
+    <p:extLst>
+      <p:ext uri="{BB962C8B-B14F-4D97-AF65-F5344CB8AC3E}">
+        <p14:creationId xmlns:p14="http://schemas.microsoft.com/office/powerpoint/2010/main" val="1650383869"/>
+      </p:ext>
+    </p:extLst>
+  </p:cSld>
+  <p:clrMapOvr>
+    <a:masterClrMapping/>
+  </p:clrMapOvr>
+</p:sld>
+</file>
+
+<file path=ppt/slides/slide21.xml><?xml version="1.0" encoding="utf-8"?>
+<p:sld xmlns:a="http://schemas.openxmlformats.org/drawingml/2006/main" xmlns:r="http://schemas.openxmlformats.org/officeDocument/2006/relationships" xmlns:p="http://schemas.openxmlformats.org/presentationml/2006/main">
+  <p:cSld>
+    <p:spTree>
+      <p:nvGrpSpPr>
+        <p:cNvPr id="1" name=""/>
+        <p:cNvGrpSpPr/>
+        <p:nvPr/>
+      </p:nvGrpSpPr>
+      <p:grpSpPr>
+        <a:xfrm>
+          <a:off x="0" y="0"/>
+          <a:ext cx="0" cy="0"/>
+          <a:chOff x="0" y="0"/>
+          <a:chExt cx="0" cy="0"/>
+        </a:xfrm>
+      </p:grpSpPr>
+      <p:sp>
+        <p:nvSpPr>
+          <p:cNvPr id="2" name="Titre 1">
+            <a:extLst>
+              <a:ext uri="{FF2B5EF4-FFF2-40B4-BE49-F238E27FC236}">
+                <a16:creationId xmlns:a16="http://schemas.microsoft.com/office/drawing/2014/main" id="{AE5B895D-F791-43E0-ACD0-CDC90B07E49C}"/>
+              </a:ext>
+            </a:extLst>
+          </p:cNvPr>
+          <p:cNvSpPr>
+            <a:spLocks noGrp="1"/>
+          </p:cNvSpPr>
+          <p:nvPr>
+            <p:ph type="title"/>
+          </p:nvPr>
+        </p:nvSpPr>
+        <p:spPr/>
+        <p:txBody>
+          <a:bodyPr/>
+          <a:lstStyle/>
+          <a:p>
+            <a:r>
+              <a:rPr lang="fr-FR" dirty="0"/>
+              <a:t>life.py</a:t>
+            </a:r>
+          </a:p>
+        </p:txBody>
+      </p:sp>
+      <p:sp>
+        <p:nvSpPr>
+          <p:cNvPr id="3" name="Espace réservé du contenu 2">
+            <a:extLst>
+              <a:ext uri="{FF2B5EF4-FFF2-40B4-BE49-F238E27FC236}">
+                <a16:creationId xmlns:a16="http://schemas.microsoft.com/office/drawing/2014/main" id="{06115230-AA6F-4CC3-B288-870240D240B8}"/>
+              </a:ext>
+            </a:extLst>
+          </p:cNvPr>
+          <p:cNvSpPr>
+            <a:spLocks noGrp="1"/>
+          </p:cNvSpPr>
+          <p:nvPr>
+            <p:ph idx="1"/>
+          </p:nvPr>
+        </p:nvSpPr>
+        <p:spPr>
+          <a:xfrm>
+            <a:off x="279400" y="1275160"/>
+            <a:ext cx="8775700" cy="3359670"/>
+          </a:xfrm>
+        </p:spPr>
+        <p:txBody>
+          <a:bodyPr/>
+          <a:lstStyle/>
+          <a:p>
+            <a:r>
+              <a:rPr lang="fr-FR" dirty="0"/>
+              <a:t>Q1: séparer affichage/calcul ( </a:t>
+            </a:r>
+            <a:r>
+              <a:rPr lang="fr-FR" dirty="0">
+                <a:sym typeface="Wingdings" panose="05000000000000000000" pitchFamily="2" charset="2"/>
+              </a:rPr>
+              <a:t> recouvrement IO/calcul classique)</a:t>
+            </a:r>
+            <a:endParaRPr lang="fr-FR" dirty="0"/>
+          </a:p>
+          <a:p>
+            <a:r>
+              <a:rPr lang="fr-FR" dirty="0"/>
+              <a:t>Q2: process 0 affiche ; process 1-N calculent une bande de la grille</a:t>
+            </a:r>
+          </a:p>
+          <a:p>
+            <a:endParaRPr lang="fr-FR" dirty="0"/>
+          </a:p>
+          <a:p>
+            <a:r>
+              <a:rPr lang="fr-FR" dirty="0"/>
+              <a:t>Q3: process 0 affiche ; </a:t>
+            </a:r>
+            <a:br>
+              <a:rPr lang="fr-FR" dirty="0"/>
+            </a:br>
+            <a:r>
+              <a:rPr lang="fr-FR" dirty="0"/>
+              <a:t>process 1àN² calculent une part de la grille:</a:t>
+            </a:r>
+          </a:p>
+        </p:txBody>
+      </p:sp>
+      <p:sp>
+        <p:nvSpPr>
+          <p:cNvPr id="4" name="Espace réservé du numéro de diapositive 3">
+            <a:extLst>
+              <a:ext uri="{FF2B5EF4-FFF2-40B4-BE49-F238E27FC236}">
+                <a16:creationId xmlns:a16="http://schemas.microsoft.com/office/drawing/2014/main" id="{7B0479DD-698C-4E78-83BA-367A4A2E300C}"/>
+              </a:ext>
+            </a:extLst>
+          </p:cNvPr>
+          <p:cNvSpPr>
+            <a:spLocks noGrp="1"/>
+          </p:cNvSpPr>
+          <p:nvPr>
+            <p:ph type="sldNum" sz="quarter" idx="10"/>
+          </p:nvPr>
+        </p:nvSpPr>
+        <p:spPr/>
+        <p:txBody>
+          <a:bodyPr/>
+          <a:lstStyle/>
+          <a:p>
+            <a:pPr>
+              <a:defRPr/>
+            </a:pPr>
+            <a:fld id="{1EEDFC2C-F9B9-0445-A511-DA4552EF3EEB}" type="slidenum">
+              <a:rPr lang="fr-FR" smtClean="0"/>
+              <a:pPr>
+                <a:defRPr/>
+              </a:pPr>
+              <a:t>21</a:t>
+            </a:fld>
+            <a:endParaRPr lang="fr-FR"/>
+          </a:p>
+        </p:txBody>
+      </p:sp>
+      <p:sp>
+        <p:nvSpPr>
+          <p:cNvPr id="5" name="Espace réservé du pied de page 4">
+            <a:extLst>
+              <a:ext uri="{FF2B5EF4-FFF2-40B4-BE49-F238E27FC236}">
+                <a16:creationId xmlns:a16="http://schemas.microsoft.com/office/drawing/2014/main" id="{D70BDEE1-D2E0-414F-9598-8D899035A24C}"/>
+              </a:ext>
+            </a:extLst>
+          </p:cNvPr>
+          <p:cNvSpPr>
+            <a:spLocks noGrp="1"/>
+          </p:cNvSpPr>
+          <p:nvPr>
+            <p:ph type="ftr" sz="quarter" idx="11"/>
+          </p:nvPr>
+        </p:nvSpPr>
+        <p:spPr/>
+        <p:txBody>
+          <a:bodyPr/>
+          <a:lstStyle/>
+          <a:p>
+            <a:r>
+              <a:rPr lang="fr-FR"/>
+              <a:t>Titre de la présentation</a:t>
+            </a:r>
+            <a:endParaRPr lang="fr-FR" dirty="0"/>
+          </a:p>
+        </p:txBody>
+      </p:sp>
+      <p:graphicFrame>
+        <p:nvGraphicFramePr>
+          <p:cNvPr id="6" name="Tableau 5">
+            <a:extLst>
+              <a:ext uri="{FF2B5EF4-FFF2-40B4-BE49-F238E27FC236}">
+                <a16:creationId xmlns:a16="http://schemas.microsoft.com/office/drawing/2014/main" id="{DDC8FDE1-4C61-45CF-9189-ED174D3BC739}"/>
+              </a:ext>
+            </a:extLst>
+          </p:cNvPr>
+          <p:cNvGraphicFramePr>
+            <a:graphicFrameLocks noGrp="1"/>
+          </p:cNvGraphicFramePr>
+          <p:nvPr>
+            <p:extLst>
+              <p:ext uri="{D42A27DB-BD31-4B8C-83A1-F6EECF244321}">
+                <p14:modId xmlns:p14="http://schemas.microsoft.com/office/powerpoint/2010/main" val="1221480000"/>
+              </p:ext>
+            </p:extLst>
+          </p:nvPr>
+        </p:nvGraphicFramePr>
+        <p:xfrm>
+          <a:off x="6887715" y="1970467"/>
+          <a:ext cx="1967880" cy="1463040"/>
+        </p:xfrm>
+        <a:graphic>
+          <a:graphicData uri="http://schemas.openxmlformats.org/drawingml/2006/table">
+            <a:tbl>
+              <a:tblPr firstRow="1" bandRow="1">
+                <a:tableStyleId>{5940675A-B579-460E-94D1-54222C63F5DA}</a:tableStyleId>
+              </a:tblPr>
+              <a:tblGrid>
+                <a:gridCol w="1967880">
+                  <a:extLst>
+                    <a:ext uri="{9D8B030D-6E8A-4147-A177-3AD203B41FA5}">
+                      <a16:colId xmlns:a16="http://schemas.microsoft.com/office/drawing/2014/main" val="4186569112"/>
+                    </a:ext>
+                  </a:extLst>
+                </a:gridCol>
+              </a:tblGrid>
+              <a:tr h="345982">
+                <a:tc>
+                  <a:txBody>
+                    <a:bodyPr/>
+                    <a:lstStyle/>
+                    <a:p>
+                      <a:r>
+                        <a:rPr lang="fr-FR" dirty="0"/>
+                        <a:t>P1</a:t>
+                      </a:r>
+                    </a:p>
+                  </a:txBody>
+                  <a:tcPr/>
+                </a:tc>
+                <a:extLst>
+                  <a:ext uri="{0D108BD9-81ED-4DB2-BD59-A6C34878D82A}">
+                    <a16:rowId xmlns:a16="http://schemas.microsoft.com/office/drawing/2014/main" val="1701726763"/>
+                  </a:ext>
+                </a:extLst>
+              </a:tr>
+              <a:tr h="345982">
+                <a:tc>
+                  <a:txBody>
+                    <a:bodyPr/>
+                    <a:lstStyle/>
+                    <a:p>
+                      <a:r>
+                        <a:rPr lang="fr-FR" dirty="0"/>
+                        <a:t>P2</a:t>
+                      </a:r>
+                    </a:p>
+                  </a:txBody>
+                  <a:tcPr/>
+                </a:tc>
+                <a:extLst>
+                  <a:ext uri="{0D108BD9-81ED-4DB2-BD59-A6C34878D82A}">
+                    <a16:rowId xmlns:a16="http://schemas.microsoft.com/office/drawing/2014/main" val="851802612"/>
+                  </a:ext>
+                </a:extLst>
+              </a:tr>
+              <a:tr h="345982">
+                <a:tc>
+                  <a:txBody>
+                    <a:bodyPr/>
+                    <a:lstStyle/>
+                    <a:p>
+                      <a:r>
+                        <a:rPr lang="fr-FR" dirty="0"/>
+                        <a:t>…</a:t>
+                      </a:r>
+                    </a:p>
+                  </a:txBody>
+                  <a:tcPr/>
+                </a:tc>
+                <a:extLst>
+                  <a:ext uri="{0D108BD9-81ED-4DB2-BD59-A6C34878D82A}">
+                    <a16:rowId xmlns:a16="http://schemas.microsoft.com/office/drawing/2014/main" val="2510640584"/>
+                  </a:ext>
+                </a:extLst>
+              </a:tr>
+              <a:tr h="345982">
+                <a:tc>
+                  <a:txBody>
+                    <a:bodyPr/>
+                    <a:lstStyle/>
+                    <a:p>
+                      <a:r>
+                        <a:rPr lang="fr-FR" dirty="0"/>
+                        <a:t>PN</a:t>
+                      </a:r>
+                    </a:p>
+                  </a:txBody>
+                  <a:tcPr/>
+                </a:tc>
+                <a:extLst>
+                  <a:ext uri="{0D108BD9-81ED-4DB2-BD59-A6C34878D82A}">
+                    <a16:rowId xmlns:a16="http://schemas.microsoft.com/office/drawing/2014/main" val="80487065"/>
+                  </a:ext>
+                </a:extLst>
+              </a:tr>
+            </a:tbl>
+          </a:graphicData>
+        </a:graphic>
+      </p:graphicFrame>
+      <p:graphicFrame>
+        <p:nvGraphicFramePr>
+          <p:cNvPr id="7" name="Tableau 6">
+            <a:extLst>
+              <a:ext uri="{FF2B5EF4-FFF2-40B4-BE49-F238E27FC236}">
+                <a16:creationId xmlns:a16="http://schemas.microsoft.com/office/drawing/2014/main" id="{8E20EE45-D9C9-416D-BA64-D3140CA8111D}"/>
+              </a:ext>
+            </a:extLst>
+          </p:cNvPr>
+          <p:cNvGraphicFramePr>
+            <a:graphicFrameLocks noGrp="1"/>
+          </p:cNvGraphicFramePr>
+          <p:nvPr>
+            <p:extLst>
+              <p:ext uri="{D42A27DB-BD31-4B8C-83A1-F6EECF244321}">
+                <p14:modId xmlns:p14="http://schemas.microsoft.com/office/powerpoint/2010/main" val="1740491736"/>
+              </p:ext>
+            </p:extLst>
+          </p:nvPr>
+        </p:nvGraphicFramePr>
+        <p:xfrm>
+          <a:off x="611560" y="3065802"/>
+          <a:ext cx="1751856" cy="735410"/>
+        </p:xfrm>
+        <a:graphic>
+          <a:graphicData uri="http://schemas.openxmlformats.org/drawingml/2006/table">
+            <a:tbl>
+              <a:tblPr firstRow="1" bandRow="1">
+                <a:tableStyleId>{5940675A-B579-460E-94D1-54222C63F5DA}</a:tableStyleId>
+              </a:tblPr>
+              <a:tblGrid>
+                <a:gridCol w="875928">
+                  <a:extLst>
+                    <a:ext uri="{9D8B030D-6E8A-4147-A177-3AD203B41FA5}">
+                      <a16:colId xmlns:a16="http://schemas.microsoft.com/office/drawing/2014/main" val="1589942166"/>
+                    </a:ext>
+                  </a:extLst>
+                </a:gridCol>
+                <a:gridCol w="875928">
+                  <a:extLst>
+                    <a:ext uri="{9D8B030D-6E8A-4147-A177-3AD203B41FA5}">
+                      <a16:colId xmlns:a16="http://schemas.microsoft.com/office/drawing/2014/main" val="2124261919"/>
+                    </a:ext>
+                  </a:extLst>
+                </a:gridCol>
+              </a:tblGrid>
+              <a:tr h="367705">
+                <a:tc>
+                  <a:txBody>
+                    <a:bodyPr/>
+                    <a:lstStyle/>
+                    <a:p>
+                      <a:r>
+                        <a:rPr lang="fr-FR" dirty="0"/>
+                        <a:t>P1</a:t>
+                      </a:r>
+                    </a:p>
+                  </a:txBody>
+                  <a:tcPr/>
+                </a:tc>
+                <a:tc>
+                  <a:txBody>
+                    <a:bodyPr/>
+                    <a:lstStyle/>
+                    <a:p>
+                      <a:r>
+                        <a:rPr lang="fr-FR" dirty="0"/>
+                        <a:t>P2</a:t>
+                      </a:r>
+                    </a:p>
+                  </a:txBody>
+                  <a:tcPr/>
+                </a:tc>
+                <a:extLst>
+                  <a:ext uri="{0D108BD9-81ED-4DB2-BD59-A6C34878D82A}">
+                    <a16:rowId xmlns:a16="http://schemas.microsoft.com/office/drawing/2014/main" val="557593144"/>
+                  </a:ext>
+                </a:extLst>
+              </a:tr>
+              <a:tr h="367705">
+                <a:tc>
+                  <a:txBody>
+                    <a:bodyPr/>
+                    <a:lstStyle/>
+                    <a:p>
+                      <a:r>
+                        <a:rPr lang="fr-FR" dirty="0"/>
+                        <a:t>P3</a:t>
+                      </a:r>
+                    </a:p>
+                  </a:txBody>
+                  <a:tcPr/>
+                </a:tc>
+                <a:tc>
+                  <a:txBody>
+                    <a:bodyPr/>
+                    <a:lstStyle/>
+                    <a:p>
+                      <a:r>
+                        <a:rPr lang="fr-FR" dirty="0"/>
+                        <a:t>P4</a:t>
+                      </a:r>
+                    </a:p>
+                  </a:txBody>
+                  <a:tcPr/>
+                </a:tc>
+                <a:extLst>
+                  <a:ext uri="{0D108BD9-81ED-4DB2-BD59-A6C34878D82A}">
+                    <a16:rowId xmlns:a16="http://schemas.microsoft.com/office/drawing/2014/main" val="938178315"/>
+                  </a:ext>
+                </a:extLst>
+              </a:tr>
+            </a:tbl>
+          </a:graphicData>
+        </a:graphic>
+      </p:graphicFrame>
+      <p:graphicFrame>
+        <p:nvGraphicFramePr>
+          <p:cNvPr id="8" name="Tableau 7">
+            <a:extLst>
+              <a:ext uri="{FF2B5EF4-FFF2-40B4-BE49-F238E27FC236}">
+                <a16:creationId xmlns:a16="http://schemas.microsoft.com/office/drawing/2014/main" id="{34D64973-BED4-4F1A-BA84-1020E9D7D08E}"/>
+              </a:ext>
+            </a:extLst>
+          </p:cNvPr>
+          <p:cNvGraphicFramePr>
+            <a:graphicFrameLocks noGrp="1"/>
+          </p:cNvGraphicFramePr>
+          <p:nvPr>
+            <p:extLst>
+              <p:ext uri="{D42A27DB-BD31-4B8C-83A1-F6EECF244321}">
+                <p14:modId xmlns:p14="http://schemas.microsoft.com/office/powerpoint/2010/main" val="2469064469"/>
+              </p:ext>
+            </p:extLst>
+          </p:nvPr>
+        </p:nvGraphicFramePr>
+        <p:xfrm>
+          <a:off x="2699792" y="3840244"/>
+          <a:ext cx="1751856" cy="735410"/>
+        </p:xfrm>
+        <a:graphic>
+          <a:graphicData uri="http://schemas.openxmlformats.org/drawingml/2006/table">
+            <a:tbl>
+              <a:tblPr firstRow="1" bandRow="1">
+                <a:tableStyleId>{5940675A-B579-460E-94D1-54222C63F5DA}</a:tableStyleId>
+              </a:tblPr>
+              <a:tblGrid>
+                <a:gridCol w="875928">
+                  <a:extLst>
+                    <a:ext uri="{9D8B030D-6E8A-4147-A177-3AD203B41FA5}">
+                      <a16:colId xmlns:a16="http://schemas.microsoft.com/office/drawing/2014/main" val="1589942166"/>
+                    </a:ext>
+                  </a:extLst>
+                </a:gridCol>
+                <a:gridCol w="875928">
+                  <a:extLst>
+                    <a:ext uri="{9D8B030D-6E8A-4147-A177-3AD203B41FA5}">
+                      <a16:colId xmlns:a16="http://schemas.microsoft.com/office/drawing/2014/main" val="2124261919"/>
+                    </a:ext>
+                  </a:extLst>
+                </a:gridCol>
+              </a:tblGrid>
+              <a:tr h="367705">
+                <a:tc>
+                  <a:txBody>
+                    <a:bodyPr/>
+                    <a:lstStyle/>
+                    <a:p>
+                      <a:r>
+                        <a:rPr lang="fr-FR" dirty="0"/>
+                        <a:t>P00</a:t>
+                      </a:r>
+                    </a:p>
+                  </a:txBody>
+                  <a:tcPr/>
+                </a:tc>
+                <a:tc>
+                  <a:txBody>
+                    <a:bodyPr/>
+                    <a:lstStyle/>
+                    <a:p>
+                      <a:r>
+                        <a:rPr lang="fr-FR" dirty="0"/>
+                        <a:t>P01</a:t>
+                      </a:r>
+                    </a:p>
+                  </a:txBody>
+                  <a:tcPr/>
+                </a:tc>
+                <a:extLst>
+                  <a:ext uri="{0D108BD9-81ED-4DB2-BD59-A6C34878D82A}">
+                    <a16:rowId xmlns:a16="http://schemas.microsoft.com/office/drawing/2014/main" val="557593144"/>
+                  </a:ext>
+                </a:extLst>
+              </a:tr>
+              <a:tr h="367705">
+                <a:tc>
+                  <a:txBody>
+                    <a:bodyPr/>
+                    <a:lstStyle/>
+                    <a:p>
+                      <a:r>
+                        <a:rPr lang="fr-FR" dirty="0"/>
+                        <a:t>P10</a:t>
+                      </a:r>
+                    </a:p>
+                  </a:txBody>
+                  <a:tcPr/>
+                </a:tc>
+                <a:tc>
+                  <a:txBody>
+                    <a:bodyPr/>
+                    <a:lstStyle/>
+                    <a:p>
+                      <a:r>
+                        <a:rPr lang="fr-FR" dirty="0"/>
+                        <a:t>P11</a:t>
+                      </a:r>
+                    </a:p>
+                  </a:txBody>
+                  <a:tcPr/>
+                </a:tc>
+                <a:extLst>
+                  <a:ext uri="{0D108BD9-81ED-4DB2-BD59-A6C34878D82A}">
+                    <a16:rowId xmlns:a16="http://schemas.microsoft.com/office/drawing/2014/main" val="938178315"/>
+                  </a:ext>
+                </a:extLst>
+              </a:tr>
+            </a:tbl>
+          </a:graphicData>
+        </a:graphic>
+      </p:graphicFrame>
+      <p:sp>
+        <p:nvSpPr>
+          <p:cNvPr id="9" name="Rectangle 8">
+            <a:extLst>
+              <a:ext uri="{FF2B5EF4-FFF2-40B4-BE49-F238E27FC236}">
+                <a16:creationId xmlns:a16="http://schemas.microsoft.com/office/drawing/2014/main" id="{E9CDEAC6-A0F5-44CF-BC5A-7BA126C0142E}"/>
+              </a:ext>
+            </a:extLst>
+          </p:cNvPr>
+          <p:cNvSpPr/>
+          <p:nvPr/>
+        </p:nvSpPr>
+        <p:spPr>
+          <a:xfrm>
+            <a:off x="2603670" y="3193913"/>
+            <a:ext cx="3384260" cy="646331"/>
+          </a:xfrm>
+          <a:prstGeom prst="rect">
+            <a:avLst/>
+          </a:prstGeom>
+        </p:spPr>
+        <p:txBody>
+          <a:bodyPr wrap="none">
+            <a:spAutoFit/>
+          </a:bodyPr>
+          <a:lstStyle/>
+          <a:p>
+            <a:r>
+              <a:rPr lang="fr-FR" sz="1200" b="0" dirty="0"/>
+              <a:t>Astuce pour plus facilement trouver les voisins:</a:t>
+            </a:r>
+            <a:br>
+              <a:rPr lang="fr-FR" sz="1200" b="0" dirty="0"/>
+            </a:br>
+            <a:r>
+              <a:rPr lang="fr-FR" sz="1200" b="0" dirty="0"/>
+              <a:t>créer un </a:t>
+            </a:r>
+            <a:r>
+              <a:rPr lang="fr-FR" sz="1200" b="0"/>
+              <a:t>sous-communicateur P1</a:t>
+            </a:r>
+            <a:r>
+              <a:rPr lang="fr-FR" sz="1200" b="0" dirty="0">
+                <a:sym typeface="Wingdings" panose="05000000000000000000" pitchFamily="2" charset="2"/>
+              </a:rPr>
+              <a:t>à</a:t>
+            </a:r>
+            <a:r>
+              <a:rPr lang="fr-FR" sz="1200" b="0"/>
+              <a:t>PN²</a:t>
+            </a:r>
+            <a:r>
+              <a:rPr lang="fr-FR" sz="1200" b="0" dirty="0"/>
+              <a:t>, </a:t>
+            </a:r>
+          </a:p>
+          <a:p>
+            <a:r>
+              <a:rPr lang="fr-FR" sz="1200" b="0" dirty="0"/>
+              <a:t>et les renuméroter en binaire</a:t>
+            </a:r>
+          </a:p>
+        </p:txBody>
+      </p:sp>
+    </p:spTree>
+    <p:extLst>
+      <p:ext uri="{BB962C8B-B14F-4D97-AF65-F5344CB8AC3E}">
+        <p14:creationId xmlns:p14="http://schemas.microsoft.com/office/powerpoint/2010/main" val="2748967131"/>
+      </p:ext>
+    </p:extLst>
+  </p:cSld>
+  <p:clrMapOvr>
+    <a:masterClrMapping/>
+  </p:clrMapOvr>
+</p:sld>
+</file>
+
+<file path=ppt/slides/slide22.xml><?xml version="1.0" encoding="utf-8"?>
+<p:sld xmlns:a="http://schemas.openxmlformats.org/drawingml/2006/main" xmlns:r="http://schemas.openxmlformats.org/officeDocument/2006/relationships" xmlns:p="http://schemas.openxmlformats.org/presentationml/2006/main">
+  <p:cSld>
+    <p:spTree>
+      <p:nvGrpSpPr>
+        <p:cNvPr id="1" name=""/>
+        <p:cNvGrpSpPr/>
+        <p:nvPr/>
+      </p:nvGrpSpPr>
+      <p:grpSpPr>
+        <a:xfrm>
+          <a:off x="0" y="0"/>
+          <a:ext cx="0" cy="0"/>
+          <a:chOff x="0" y="0"/>
+          <a:chExt cx="0" cy="0"/>
+        </a:xfrm>
+      </p:grpSpPr>
+      <p:sp>
+        <p:nvSpPr>
+          <p:cNvPr id="2" name="Titre 1">
+            <a:extLst>
+              <a:ext uri="{FF2B5EF4-FFF2-40B4-BE49-F238E27FC236}">
+                <a16:creationId xmlns:a16="http://schemas.microsoft.com/office/drawing/2014/main" id="{4A4553A5-3F58-4031-AF4B-607AD57DAFC8}"/>
+              </a:ext>
+            </a:extLst>
+          </p:cNvPr>
+          <p:cNvSpPr>
+            <a:spLocks noGrp="1"/>
+          </p:cNvSpPr>
+          <p:nvPr>
+            <p:ph type="title"/>
+          </p:nvPr>
+        </p:nvSpPr>
+        <p:spPr/>
+        <p:txBody>
+          <a:bodyPr/>
+          <a:lstStyle/>
+          <a:p>
+            <a:r>
+              <a:rPr lang="fr-FR" dirty="0"/>
+              <a:t>Life.py</a:t>
+            </a:r>
+          </a:p>
+        </p:txBody>
+      </p:sp>
+      <p:sp>
+        <p:nvSpPr>
+          <p:cNvPr id="3" name="Espace réservé du contenu 2">
+            <a:extLst>
+              <a:ext uri="{FF2B5EF4-FFF2-40B4-BE49-F238E27FC236}">
+                <a16:creationId xmlns:a16="http://schemas.microsoft.com/office/drawing/2014/main" id="{67D93E3F-A96B-4D52-AA73-57CCBF9D054E}"/>
+              </a:ext>
+            </a:extLst>
+          </p:cNvPr>
+          <p:cNvSpPr>
+            <a:spLocks noGrp="1"/>
+          </p:cNvSpPr>
+          <p:nvPr>
+            <p:ph idx="1"/>
+          </p:nvPr>
+        </p:nvSpPr>
+        <p:spPr/>
+        <p:txBody>
+          <a:bodyPr/>
+          <a:lstStyle/>
+          <a:p>
+            <a:r>
+              <a:rPr lang="fr-FR" dirty="0"/>
+              <a:t>README.md</a:t>
+            </a:r>
+          </a:p>
+          <a:p>
+            <a:pPr lvl="1"/>
+            <a:r>
+              <a:rPr lang="fr-FR" dirty="0"/>
+              <a:t>Analyse a priori</a:t>
+            </a:r>
+          </a:p>
+          <a:p>
+            <a:pPr lvl="1"/>
+            <a:r>
+              <a:rPr lang="fr-FR" dirty="0"/>
+              <a:t>Expliquer la stratégie de parallélisation</a:t>
+            </a:r>
+          </a:p>
+          <a:p>
+            <a:pPr lvl="1"/>
+            <a:r>
+              <a:rPr lang="fr-FR" dirty="0"/>
+              <a:t>Vérification du code</a:t>
+            </a:r>
+          </a:p>
+          <a:p>
+            <a:pPr lvl="1"/>
+            <a:r>
+              <a:rPr lang="fr-FR" dirty="0"/>
+              <a:t>Mesure et analyse des performances</a:t>
+            </a:r>
+          </a:p>
+          <a:p>
+            <a:r>
+              <a:rPr lang="fr-FR" dirty="0"/>
+              <a:t>Une façon intéressante d’éviter tous les if </a:t>
+            </a:r>
+            <a:r>
+              <a:rPr lang="fr-FR" dirty="0" err="1"/>
+              <a:t>rank</a:t>
+            </a:r>
+            <a:r>
+              <a:rPr lang="fr-FR" dirty="0"/>
+              <a:t>==0 : </a:t>
+            </a:r>
+            <a:r>
+              <a:rPr lang="fr-FR" dirty="0" err="1"/>
+              <a:t>app.draw</a:t>
+            </a:r>
+            <a:r>
+              <a:rPr lang="fr-FR" dirty="0"/>
+              <a:t>()</a:t>
+            </a:r>
+            <a:br>
+              <a:rPr lang="fr-FR" dirty="0"/>
+            </a:br>
+            <a:r>
+              <a:rPr lang="fr-FR" dirty="0"/>
+              <a:t>splitter le programme en 2 fichiers puis :</a:t>
+            </a:r>
+          </a:p>
+          <a:p>
+            <a:pPr marL="457200" lvl="1" indent="0">
+              <a:buNone/>
+            </a:pPr>
+            <a:r>
+              <a:rPr lang="fr-FR" dirty="0" err="1"/>
+              <a:t>mpirun</a:t>
+            </a:r>
+            <a:r>
+              <a:rPr lang="fr-FR" dirty="0"/>
+              <a:t> –</a:t>
+            </a:r>
+            <a:r>
+              <a:rPr lang="fr-FR" dirty="0" err="1"/>
+              <a:t>np</a:t>
+            </a:r>
+            <a:r>
+              <a:rPr lang="fr-FR" dirty="0"/>
+              <a:t> 1 gui.py : -</a:t>
+            </a:r>
+            <a:r>
+              <a:rPr lang="fr-FR" dirty="0" err="1"/>
+              <a:t>np</a:t>
+            </a:r>
+            <a:r>
+              <a:rPr lang="fr-FR" dirty="0"/>
+              <a:t> 4 grid.py</a:t>
+            </a:r>
+          </a:p>
+        </p:txBody>
+      </p:sp>
+      <p:sp>
+        <p:nvSpPr>
+          <p:cNvPr id="4" name="Espace réservé du numéro de diapositive 3">
+            <a:extLst>
+              <a:ext uri="{FF2B5EF4-FFF2-40B4-BE49-F238E27FC236}">
+                <a16:creationId xmlns:a16="http://schemas.microsoft.com/office/drawing/2014/main" id="{6857FEA4-5FA7-4D66-A31C-897C9886726F}"/>
+              </a:ext>
+            </a:extLst>
+          </p:cNvPr>
+          <p:cNvSpPr>
+            <a:spLocks noGrp="1"/>
+          </p:cNvSpPr>
+          <p:nvPr>
+            <p:ph type="sldNum" sz="quarter" idx="10"/>
+          </p:nvPr>
+        </p:nvSpPr>
+        <p:spPr/>
+        <p:txBody>
+          <a:bodyPr/>
+          <a:lstStyle/>
+          <a:p>
+            <a:pPr>
+              <a:defRPr/>
+            </a:pPr>
+            <a:fld id="{1EEDFC2C-F9B9-0445-A511-DA4552EF3EEB}" type="slidenum">
+              <a:rPr lang="fr-FR" smtClean="0"/>
+              <a:pPr>
+                <a:defRPr/>
+              </a:pPr>
+              <a:t>22</a:t>
+            </a:fld>
+            <a:endParaRPr lang="fr-FR"/>
+          </a:p>
+        </p:txBody>
+      </p:sp>
+      <p:sp>
+        <p:nvSpPr>
+          <p:cNvPr id="5" name="Espace réservé du pied de page 4">
+            <a:extLst>
+              <a:ext uri="{FF2B5EF4-FFF2-40B4-BE49-F238E27FC236}">
+                <a16:creationId xmlns:a16="http://schemas.microsoft.com/office/drawing/2014/main" id="{32B778F3-1C0D-4922-8B8A-4A0A3AB7E2CF}"/>
+              </a:ext>
+            </a:extLst>
+          </p:cNvPr>
+          <p:cNvSpPr>
+            <a:spLocks noGrp="1"/>
+          </p:cNvSpPr>
+          <p:nvPr>
+            <p:ph type="ftr" sz="quarter" idx="11"/>
+          </p:nvPr>
+        </p:nvSpPr>
+        <p:spPr/>
+        <p:txBody>
+          <a:bodyPr/>
+          <a:lstStyle/>
+          <a:p>
+            <a:r>
+              <a:rPr lang="fr-FR" dirty="0"/>
+              <a:t>Titre de la présentation</a:t>
+            </a:r>
+          </a:p>
+        </p:txBody>
+      </p:sp>
+    </p:spTree>
+    <p:extLst>
+      <p:ext uri="{BB962C8B-B14F-4D97-AF65-F5344CB8AC3E}">
+        <p14:creationId xmlns:p14="http://schemas.microsoft.com/office/powerpoint/2010/main" val="2988568835"/>
+      </p:ext>
+    </p:extLst>
+  </p:cSld>
+  <p:clrMapOvr>
+    <a:masterClrMapping/>
+  </p:clrMapOvr>
+</p:sld>
+</file>
+
+<file path=ppt/slides/slide23.xml><?xml version="1.0" encoding="utf-8"?>
+<p:sld xmlns:a="http://schemas.openxmlformats.org/drawingml/2006/main" xmlns:r="http://schemas.openxmlformats.org/officeDocument/2006/relationships" xmlns:p="http://schemas.openxmlformats.org/presentationml/2006/main">
+  <p:cSld>
+    <p:spTree>
+      <p:nvGrpSpPr>
+        <p:cNvPr id="1" name=""/>
+        <p:cNvGrpSpPr/>
+        <p:nvPr/>
+      </p:nvGrpSpPr>
+      <p:grpSpPr>
+        <a:xfrm>
+          <a:off x="0" y="0"/>
+          <a:ext cx="0" cy="0"/>
+          <a:chOff x="0" y="0"/>
+          <a:chExt cx="0" cy="0"/>
+        </a:xfrm>
+      </p:grpSpPr>
+      <p:sp>
+        <p:nvSpPr>
+          <p:cNvPr id="2" name="Titre 1">
+            <a:extLst>
+              <a:ext uri="{FF2B5EF4-FFF2-40B4-BE49-F238E27FC236}">
+                <a16:creationId xmlns:a16="http://schemas.microsoft.com/office/drawing/2014/main" id="{045965F2-FBE1-4278-8777-4D5594669E3B}"/>
+              </a:ext>
+            </a:extLst>
+          </p:cNvPr>
+          <p:cNvSpPr>
+            <a:spLocks noGrp="1"/>
+          </p:cNvSpPr>
+          <p:nvPr>
+            <p:ph type="title"/>
+          </p:nvPr>
+        </p:nvSpPr>
+        <p:spPr/>
+        <p:txBody>
+          <a:bodyPr/>
+          <a:lstStyle/>
+          <a:p>
+            <a:endParaRPr lang="fr-FR"/>
+          </a:p>
+        </p:txBody>
+      </p:sp>
+      <p:sp>
+        <p:nvSpPr>
+          <p:cNvPr id="3" name="Espace réservé du contenu 2">
+            <a:extLst>
+              <a:ext uri="{FF2B5EF4-FFF2-40B4-BE49-F238E27FC236}">
+                <a16:creationId xmlns:a16="http://schemas.microsoft.com/office/drawing/2014/main" id="{8527EEAC-4E07-4564-9D51-C92727CFD110}"/>
+              </a:ext>
+            </a:extLst>
+          </p:cNvPr>
+          <p:cNvSpPr>
+            <a:spLocks noGrp="1"/>
+          </p:cNvSpPr>
+          <p:nvPr>
+            <p:ph idx="1"/>
+          </p:nvPr>
+        </p:nvSpPr>
+        <p:spPr/>
+        <p:txBody>
+          <a:bodyPr/>
+          <a:lstStyle/>
+          <a:p>
+            <a:endParaRPr lang="fr-FR"/>
+          </a:p>
+        </p:txBody>
+      </p:sp>
+      <p:sp>
+        <p:nvSpPr>
+          <p:cNvPr id="4" name="Espace réservé du numéro de diapositive 3">
+            <a:extLst>
+              <a:ext uri="{FF2B5EF4-FFF2-40B4-BE49-F238E27FC236}">
+                <a16:creationId xmlns:a16="http://schemas.microsoft.com/office/drawing/2014/main" id="{57FA15BE-9B24-4879-9FC3-DA05E03792E2}"/>
+              </a:ext>
+            </a:extLst>
+          </p:cNvPr>
+          <p:cNvSpPr>
+            <a:spLocks noGrp="1"/>
+          </p:cNvSpPr>
+          <p:nvPr>
+            <p:ph type="sldNum" sz="quarter" idx="10"/>
+          </p:nvPr>
+        </p:nvSpPr>
+        <p:spPr/>
+        <p:txBody>
+          <a:bodyPr/>
+          <a:lstStyle/>
+          <a:p>
+            <a:pPr>
+              <a:defRPr/>
+            </a:pPr>
+            <a:fld id="{1EEDFC2C-F9B9-0445-A511-DA4552EF3EEB}" type="slidenum">
+              <a:rPr lang="fr-FR" smtClean="0"/>
+              <a:pPr>
+                <a:defRPr/>
+              </a:pPr>
+              <a:t>23</a:t>
+            </a:fld>
+            <a:endParaRPr lang="fr-FR"/>
+          </a:p>
+        </p:txBody>
+      </p:sp>
+      <p:sp>
+        <p:nvSpPr>
+          <p:cNvPr id="5" name="Espace réservé du pied de page 4">
+            <a:extLst>
+              <a:ext uri="{FF2B5EF4-FFF2-40B4-BE49-F238E27FC236}">
+                <a16:creationId xmlns:a16="http://schemas.microsoft.com/office/drawing/2014/main" id="{FBC56BAE-290C-4D69-8692-597762D1E31F}"/>
+              </a:ext>
+            </a:extLst>
+          </p:cNvPr>
+          <p:cNvSpPr>
+            <a:spLocks noGrp="1"/>
+          </p:cNvSpPr>
+          <p:nvPr>
+            <p:ph type="ftr" sz="quarter" idx="11"/>
+          </p:nvPr>
+        </p:nvSpPr>
+        <p:spPr/>
+        <p:txBody>
+          <a:bodyPr/>
+          <a:lstStyle/>
+          <a:p>
+            <a:r>
+              <a:rPr lang="fr-FR"/>
+              <a:t>Titre de la présentation</a:t>
+            </a:r>
+            <a:endParaRPr lang="fr-FR" dirty="0"/>
+          </a:p>
+        </p:txBody>
+      </p:sp>
+    </p:spTree>
+    <p:extLst>
+      <p:ext uri="{BB962C8B-B14F-4D97-AF65-F5344CB8AC3E}">
+        <p14:creationId xmlns:p14="http://schemas.microsoft.com/office/powerpoint/2010/main" val="323767224"/>
+      </p:ext>
+    </p:extLst>
+  </p:cSld>
+  <p:clrMapOvr>
+    <a:masterClrMapping/>
+  </p:clrMapOvr>
+</p:sld>
+</file>
+
+<file path=ppt/slides/slide24.xml><?xml version="1.0" encoding="utf-8"?>
+<p:sld xmlns:a="http://schemas.openxmlformats.org/drawingml/2006/main" xmlns:r="http://schemas.openxmlformats.org/officeDocument/2006/relationships" xmlns:p="http://schemas.openxmlformats.org/presentationml/2006/main">
+  <p:cSld>
+    <p:spTree>
+      <p:nvGrpSpPr>
+        <p:cNvPr id="1" name=""/>
+        <p:cNvGrpSpPr/>
+        <p:nvPr/>
+      </p:nvGrpSpPr>
+      <p:grpSpPr>
+        <a:xfrm>
+          <a:off x="0" y="0"/>
+          <a:ext cx="0" cy="0"/>
+          <a:chOff x="0" y="0"/>
+          <a:chExt cx="0" cy="0"/>
+        </a:xfrm>
+      </p:grpSpPr>
+      <p:sp>
+        <p:nvSpPr>
+          <p:cNvPr id="2" name="Titre 1">
+            <a:extLst>
+              <a:ext uri="{FF2B5EF4-FFF2-40B4-BE49-F238E27FC236}">
+                <a16:creationId xmlns:a16="http://schemas.microsoft.com/office/drawing/2014/main" id="{E2E9E4C5-ECF6-4AAF-AFC7-56423A3540A5}"/>
+              </a:ext>
+            </a:extLst>
+          </p:cNvPr>
+          <p:cNvSpPr>
+            <a:spLocks noGrp="1"/>
+          </p:cNvSpPr>
+          <p:nvPr>
+            <p:ph type="title"/>
+          </p:nvPr>
+        </p:nvSpPr>
+        <p:spPr/>
+        <p:txBody>
+          <a:bodyPr/>
+          <a:lstStyle/>
+          <a:p>
+            <a:r>
+              <a:rPr lang="fr-FR" dirty="0"/>
+              <a:t>Projets fourmis</a:t>
+            </a:r>
+          </a:p>
+        </p:txBody>
+      </p:sp>
+      <p:sp>
+        <p:nvSpPr>
+          <p:cNvPr id="3" name="Espace réservé du contenu 2">
+            <a:extLst>
+              <a:ext uri="{FF2B5EF4-FFF2-40B4-BE49-F238E27FC236}">
+                <a16:creationId xmlns:a16="http://schemas.microsoft.com/office/drawing/2014/main" id="{F225B9BA-1F4A-4D42-8409-21D02ADC9285}"/>
+              </a:ext>
+            </a:extLst>
+          </p:cNvPr>
+          <p:cNvSpPr>
+            <a:spLocks noGrp="1"/>
+          </p:cNvSpPr>
+          <p:nvPr>
+            <p:ph idx="1"/>
+          </p:nvPr>
+        </p:nvSpPr>
+        <p:spPr/>
+        <p:txBody>
+          <a:bodyPr/>
+          <a:lstStyle/>
+          <a:p>
+            <a:r>
+              <a:rPr lang="fr-FR" dirty="0"/>
+              <a:t>Ok pour le faire en </a:t>
+            </a:r>
+            <a:r>
+              <a:rPr lang="fr-FR" dirty="0" err="1"/>
+              <a:t>binome</a:t>
+            </a:r>
+            <a:endParaRPr lang="fr-FR" dirty="0"/>
+          </a:p>
+          <a:p>
+            <a:r>
+              <a:rPr lang="fr-FR" dirty="0"/>
+              <a:t>Merci de l’indiquer quand vous enverrez le lien git</a:t>
+            </a:r>
+          </a:p>
+          <a:p>
+            <a:r>
+              <a:rPr lang="fr-FR" dirty="0"/>
+              <a:t>Mais évidemment la soutenance est </a:t>
+            </a:r>
+            <a:r>
+              <a:rPr lang="fr-FR" dirty="0" err="1"/>
+              <a:t>invividuelle</a:t>
+            </a:r>
+            <a:endParaRPr lang="fr-FR" dirty="0"/>
+          </a:p>
+          <a:p>
+            <a:r>
+              <a:rPr lang="fr-FR" dirty="0"/>
+              <a:t>Soutenance : attention le timing est très serré (&lt;9 min), donc on ira a l’essentiel !</a:t>
+            </a:r>
+          </a:p>
+          <a:p>
+            <a:pPr lvl="1"/>
+            <a:r>
+              <a:rPr lang="fr-FR" dirty="0"/>
+              <a:t>Mode merge </a:t>
+            </a:r>
+            <a:r>
+              <a:rPr lang="fr-FR" dirty="0" err="1"/>
+              <a:t>request</a:t>
+            </a:r>
+            <a:r>
+              <a:rPr lang="fr-FR" dirty="0"/>
+              <a:t> peut </a:t>
+            </a:r>
+            <a:r>
+              <a:rPr lang="fr-FR"/>
+              <a:t>être très efficace</a:t>
+            </a:r>
+            <a:endParaRPr lang="fr-FR" dirty="0"/>
+          </a:p>
+        </p:txBody>
+      </p:sp>
+      <p:sp>
+        <p:nvSpPr>
+          <p:cNvPr id="4" name="Espace réservé du numéro de diapositive 3">
+            <a:extLst>
+              <a:ext uri="{FF2B5EF4-FFF2-40B4-BE49-F238E27FC236}">
+                <a16:creationId xmlns:a16="http://schemas.microsoft.com/office/drawing/2014/main" id="{B1F3E848-B46E-476C-BF5F-D6F2001DA01E}"/>
+              </a:ext>
+            </a:extLst>
+          </p:cNvPr>
+          <p:cNvSpPr>
+            <a:spLocks noGrp="1"/>
+          </p:cNvSpPr>
+          <p:nvPr>
+            <p:ph type="sldNum" sz="quarter" idx="10"/>
+          </p:nvPr>
+        </p:nvSpPr>
+        <p:spPr/>
+        <p:txBody>
+          <a:bodyPr/>
+          <a:lstStyle/>
+          <a:p>
+            <a:pPr>
+              <a:defRPr/>
+            </a:pPr>
+            <a:fld id="{1EEDFC2C-F9B9-0445-A511-DA4552EF3EEB}" type="slidenum">
+              <a:rPr lang="fr-FR" smtClean="0"/>
+              <a:pPr>
+                <a:defRPr/>
+              </a:pPr>
+              <a:t>24</a:t>
+            </a:fld>
+            <a:endParaRPr lang="fr-FR"/>
+          </a:p>
+        </p:txBody>
+      </p:sp>
+      <p:sp>
+        <p:nvSpPr>
+          <p:cNvPr id="5" name="Espace réservé du pied de page 4">
+            <a:extLst>
+              <a:ext uri="{FF2B5EF4-FFF2-40B4-BE49-F238E27FC236}">
+                <a16:creationId xmlns:a16="http://schemas.microsoft.com/office/drawing/2014/main" id="{AFECA678-1914-495F-81E8-F8072A54B626}"/>
+              </a:ext>
+            </a:extLst>
+          </p:cNvPr>
+          <p:cNvSpPr>
+            <a:spLocks noGrp="1"/>
+          </p:cNvSpPr>
+          <p:nvPr>
+            <p:ph type="ftr" sz="quarter" idx="11"/>
+          </p:nvPr>
+        </p:nvSpPr>
+        <p:spPr/>
+        <p:txBody>
+          <a:bodyPr/>
+          <a:lstStyle/>
+          <a:p>
+            <a:r>
+              <a:rPr lang="fr-FR"/>
+              <a:t>Titre de la présentation</a:t>
+            </a:r>
+            <a:endParaRPr lang="fr-FR" dirty="0"/>
+          </a:p>
+        </p:txBody>
+      </p:sp>
+    </p:spTree>
+    <p:extLst>
+      <p:ext uri="{BB962C8B-B14F-4D97-AF65-F5344CB8AC3E}">
+        <p14:creationId xmlns:p14="http://schemas.microsoft.com/office/powerpoint/2010/main" val="1076750466"/>
       </p:ext>
     </p:extLst>
   </p:cSld>
@@ -8252,7 +9615,7 @@
         <a:effectLst/>
         <a:extLst>
           <a:ext uri="{AF507438-7753-43e0-B8FC-AC1667EBCBE1}">
-            <a14:hiddenEffects xmlns="" xmlns:a14="http://schemas.microsoft.com/office/drawing/2010/main">
+            <a14:hiddenEffects xmlns:a14="http://schemas.microsoft.com/office/drawing/2010/main" xmlns="">
               <a:effectLst>
                 <a:outerShdw blurRad="63500" dist="38099" dir="2700000" algn="ctr" rotWithShape="0">
                   <a:schemeClr val="bg2">
@@ -8329,7 +9692,7 @@
         <a:effectLst/>
         <a:extLst>
           <a:ext uri="{AF507438-7753-43e0-B8FC-AC1667EBCBE1}">
-            <a14:hiddenEffects xmlns="" xmlns:a14="http://schemas.microsoft.com/office/drawing/2010/main">
+            <a14:hiddenEffects xmlns:a14="http://schemas.microsoft.com/office/drawing/2010/main" xmlns="">
               <a:effectLst>
                 <a:outerShdw blurRad="63500" dist="38099" dir="2700000" algn="ctr" rotWithShape="0">
                   <a:schemeClr val="bg2">

</xml_diff>